<commit_message>
better styling for the Homeview and Postview
</commit_message>
<xml_diff>
--- a/Dokumentation/ChipslyFans_Mockup.pptx
+++ b/Dokumentation/ChipslyFans_Mockup.pptx
@@ -5,7 +5,7 @@
     <p:sldMasterId id="2147483648" r:id="rId1"/>
   </p:sldMasterIdLst>
   <p:notesMasterIdLst>
-    <p:notesMasterId r:id="rId10"/>
+    <p:notesMasterId r:id="rId11"/>
   </p:notesMasterIdLst>
   <p:sldIdLst>
     <p:sldId id="258" r:id="rId2"/>
@@ -16,6 +16,7 @@
     <p:sldId id="262" r:id="rId7"/>
     <p:sldId id="263" r:id="rId8"/>
     <p:sldId id="264" r:id="rId9"/>
+    <p:sldId id="266" r:id="rId10"/>
   </p:sldIdLst>
   <p:sldSz cx="12192000" cy="6858000"/>
   <p:notesSz cx="6858000" cy="9144000"/>
@@ -125,7 +126,7 @@
 <file path=ppt/revisionInfo.xml><?xml version="1.0" encoding="utf-8"?>
 <p1510:revInfo xmlns:a="http://schemas.openxmlformats.org/drawingml/2006/main" xmlns:r="http://schemas.openxmlformats.org/officeDocument/2006/relationships" xmlns:p1510="http://schemas.microsoft.com/office/powerpoint/2015/10/main">
   <p1510:revLst>
-    <p1510:client id="{D818A552-0435-4C13-BBB8-DB0F902B1CAB}" v="329" dt="2025-03-31T12:03:03.683"/>
+    <p1510:client id="{835628C4-37B0-452A-9B17-982F10A0CE80}" v="200" dt="2025-04-17T17:44:21.063"/>
   </p1510:revLst>
 </p1510:revInfo>
 </file>
@@ -2954,6 +2955,302 @@
       </pc:sldChg>
     </pc:docChg>
   </pc:docChgLst>
+  <pc:docChgLst>
+    <pc:chgData name="FMZ; Allamand Luis" userId="0299a935-3d7a-4961-b16c-bd784a8bde54" providerId="ADAL" clId="{835628C4-37B0-452A-9B17-982F10A0CE80}"/>
+    <pc:docChg chg="undo custSel addSld modSld">
+      <pc:chgData name="FMZ; Allamand Luis" userId="0299a935-3d7a-4961-b16c-bd784a8bde54" providerId="ADAL" clId="{835628C4-37B0-452A-9B17-982F10A0CE80}" dt="2025-04-17T17:44:35.280" v="497" actId="166"/>
+      <pc:docMkLst>
+        <pc:docMk/>
+      </pc:docMkLst>
+      <pc:sldChg chg="addSp delSp modSp new mod">
+        <pc:chgData name="FMZ; Allamand Luis" userId="0299a935-3d7a-4961-b16c-bd784a8bde54" providerId="ADAL" clId="{835628C4-37B0-452A-9B17-982F10A0CE80}" dt="2025-04-17T17:44:35.280" v="497" actId="166"/>
+        <pc:sldMkLst>
+          <pc:docMk/>
+          <pc:sldMk cId="1911781007" sldId="266"/>
+        </pc:sldMkLst>
+        <pc:spChg chg="del">
+          <ac:chgData name="FMZ; Allamand Luis" userId="0299a935-3d7a-4961-b16c-bd784a8bde54" providerId="ADAL" clId="{835628C4-37B0-452A-9B17-982F10A0CE80}" dt="2025-04-17T17:31:08.700" v="1" actId="478"/>
+          <ac:spMkLst>
+            <pc:docMk/>
+            <pc:sldMk cId="1911781007" sldId="266"/>
+            <ac:spMk id="2" creationId="{A87022D4-AE12-B584-172F-6613CA4ADB0E}"/>
+          </ac:spMkLst>
+        </pc:spChg>
+        <pc:spChg chg="del">
+          <ac:chgData name="FMZ; Allamand Luis" userId="0299a935-3d7a-4961-b16c-bd784a8bde54" providerId="ADAL" clId="{835628C4-37B0-452A-9B17-982F10A0CE80}" dt="2025-04-17T17:31:10.340" v="2" actId="478"/>
+          <ac:spMkLst>
+            <pc:docMk/>
+            <pc:sldMk cId="1911781007" sldId="266"/>
+            <ac:spMk id="3" creationId="{8D6CA581-BB09-6B20-0245-4F2C78080A4F}"/>
+          </ac:spMkLst>
+        </pc:spChg>
+        <pc:spChg chg="add mod">
+          <ac:chgData name="FMZ; Allamand Luis" userId="0299a935-3d7a-4961-b16c-bd784a8bde54" providerId="ADAL" clId="{835628C4-37B0-452A-9B17-982F10A0CE80}" dt="2025-04-17T17:37:57.211" v="214" actId="34135"/>
+          <ac:spMkLst>
+            <pc:docMk/>
+            <pc:sldMk cId="1911781007" sldId="266"/>
+            <ac:spMk id="8" creationId="{825E49D4-A7F9-7A1C-D16D-5B984935E901}"/>
+          </ac:spMkLst>
+        </pc:spChg>
+        <pc:spChg chg="del mod topLvl">
+          <ac:chgData name="FMZ; Allamand Luis" userId="0299a935-3d7a-4961-b16c-bd784a8bde54" providerId="ADAL" clId="{835628C4-37B0-452A-9B17-982F10A0CE80}" dt="2025-04-17T17:38:48.915" v="248" actId="478"/>
+          <ac:spMkLst>
+            <pc:docMk/>
+            <pc:sldMk cId="1911781007" sldId="266"/>
+            <ac:spMk id="17" creationId="{5F5CD28F-EF07-9B37-2AB9-C530CBC21750}"/>
+          </ac:spMkLst>
+        </pc:spChg>
+        <pc:spChg chg="del mod topLvl">
+          <ac:chgData name="FMZ; Allamand Luis" userId="0299a935-3d7a-4961-b16c-bd784a8bde54" providerId="ADAL" clId="{835628C4-37B0-452A-9B17-982F10A0CE80}" dt="2025-04-17T17:38:15.960" v="217" actId="478"/>
+          <ac:spMkLst>
+            <pc:docMk/>
+            <pc:sldMk cId="1911781007" sldId="266"/>
+            <ac:spMk id="18" creationId="{AF3767E6-F31D-A1D4-A483-DB542C6AE3B0}"/>
+          </ac:spMkLst>
+        </pc:spChg>
+        <pc:spChg chg="add mod">
+          <ac:chgData name="FMZ; Allamand Luis" userId="0299a935-3d7a-4961-b16c-bd784a8bde54" providerId="ADAL" clId="{835628C4-37B0-452A-9B17-982F10A0CE80}" dt="2025-04-17T17:42:47.830" v="394" actId="1036"/>
+          <ac:spMkLst>
+            <pc:docMk/>
+            <pc:sldMk cId="1911781007" sldId="266"/>
+            <ac:spMk id="19" creationId="{10B0A611-C79F-B8C8-DECC-02C144BDE5EB}"/>
+          </ac:spMkLst>
+        </pc:spChg>
+        <pc:spChg chg="add mod">
+          <ac:chgData name="FMZ; Allamand Luis" userId="0299a935-3d7a-4961-b16c-bd784a8bde54" providerId="ADAL" clId="{835628C4-37B0-452A-9B17-982F10A0CE80}" dt="2025-04-17T17:42:47.830" v="394" actId="1036"/>
+          <ac:spMkLst>
+            <pc:docMk/>
+            <pc:sldMk cId="1911781007" sldId="266"/>
+            <ac:spMk id="20" creationId="{A0006C0F-3D7A-FDFA-C571-94CBFBC8836E}"/>
+          </ac:spMkLst>
+        </pc:spChg>
+        <pc:spChg chg="add mod">
+          <ac:chgData name="FMZ; Allamand Luis" userId="0299a935-3d7a-4961-b16c-bd784a8bde54" providerId="ADAL" clId="{835628C4-37B0-452A-9B17-982F10A0CE80}" dt="2025-04-17T17:42:47.830" v="394" actId="1036"/>
+          <ac:spMkLst>
+            <pc:docMk/>
+            <pc:sldMk cId="1911781007" sldId="266"/>
+            <ac:spMk id="21" creationId="{24AF1350-3143-46F9-89D2-709B1E4DF2A1}"/>
+          </ac:spMkLst>
+        </pc:spChg>
+        <pc:spChg chg="add mod">
+          <ac:chgData name="FMZ; Allamand Luis" userId="0299a935-3d7a-4961-b16c-bd784a8bde54" providerId="ADAL" clId="{835628C4-37B0-452A-9B17-982F10A0CE80}" dt="2025-04-17T17:42:47.830" v="394" actId="1036"/>
+          <ac:spMkLst>
+            <pc:docMk/>
+            <pc:sldMk cId="1911781007" sldId="266"/>
+            <ac:spMk id="22" creationId="{85236FFF-FC1D-A36A-558A-B9E792DC8EFD}"/>
+          </ac:spMkLst>
+        </pc:spChg>
+        <pc:spChg chg="add mod">
+          <ac:chgData name="FMZ; Allamand Luis" userId="0299a935-3d7a-4961-b16c-bd784a8bde54" providerId="ADAL" clId="{835628C4-37B0-452A-9B17-982F10A0CE80}" dt="2025-04-17T17:41:13.531" v="356" actId="1037"/>
+          <ac:spMkLst>
+            <pc:docMk/>
+            <pc:sldMk cId="1911781007" sldId="266"/>
+            <ac:spMk id="27" creationId="{68C337B5-1168-806D-6BFB-85C6FD54C1D5}"/>
+          </ac:spMkLst>
+        </pc:spChg>
+        <pc:spChg chg="add del mod">
+          <ac:chgData name="FMZ; Allamand Luis" userId="0299a935-3d7a-4961-b16c-bd784a8bde54" providerId="ADAL" clId="{835628C4-37B0-452A-9B17-982F10A0CE80}" dt="2025-04-17T17:43:03.904" v="483" actId="478"/>
+          <ac:spMkLst>
+            <pc:docMk/>
+            <pc:sldMk cId="1911781007" sldId="266"/>
+            <ac:spMk id="34" creationId="{6A4D80DB-702A-5816-0625-C5A7D04E95A9}"/>
+          </ac:spMkLst>
+        </pc:spChg>
+        <pc:spChg chg="add del mod">
+          <ac:chgData name="FMZ; Allamand Luis" userId="0299a935-3d7a-4961-b16c-bd784a8bde54" providerId="ADAL" clId="{835628C4-37B0-452A-9B17-982F10A0CE80}" dt="2025-04-17T17:43:03.904" v="483" actId="478"/>
+          <ac:spMkLst>
+            <pc:docMk/>
+            <pc:sldMk cId="1911781007" sldId="266"/>
+            <ac:spMk id="35" creationId="{50641E36-2945-FEB9-761B-8A7AEB3131D4}"/>
+          </ac:spMkLst>
+        </pc:spChg>
+        <pc:spChg chg="add del mod">
+          <ac:chgData name="FMZ; Allamand Luis" userId="0299a935-3d7a-4961-b16c-bd784a8bde54" providerId="ADAL" clId="{835628C4-37B0-452A-9B17-982F10A0CE80}" dt="2025-04-17T17:43:03.904" v="483" actId="478"/>
+          <ac:spMkLst>
+            <pc:docMk/>
+            <pc:sldMk cId="1911781007" sldId="266"/>
+            <ac:spMk id="36" creationId="{45C43600-5A45-F618-7833-5F5633FDD5DD}"/>
+          </ac:spMkLst>
+        </pc:spChg>
+        <pc:spChg chg="add del mod">
+          <ac:chgData name="FMZ; Allamand Luis" userId="0299a935-3d7a-4961-b16c-bd784a8bde54" providerId="ADAL" clId="{835628C4-37B0-452A-9B17-982F10A0CE80}" dt="2025-04-17T17:43:03.904" v="483" actId="478"/>
+          <ac:spMkLst>
+            <pc:docMk/>
+            <pc:sldMk cId="1911781007" sldId="266"/>
+            <ac:spMk id="37" creationId="{53601F80-3353-DA43-0596-D3B490C87581}"/>
+          </ac:spMkLst>
+        </pc:spChg>
+        <pc:spChg chg="add mod">
+          <ac:chgData name="FMZ; Allamand Luis" userId="0299a935-3d7a-4961-b16c-bd784a8bde54" providerId="ADAL" clId="{835628C4-37B0-452A-9B17-982F10A0CE80}" dt="2025-04-17T17:43:59.395" v="489" actId="1076"/>
+          <ac:spMkLst>
+            <pc:docMk/>
+            <pc:sldMk cId="1911781007" sldId="266"/>
+            <ac:spMk id="39" creationId="{071E423D-35A2-AFA4-2E8B-91DC1E0422B3}"/>
+          </ac:spMkLst>
+        </pc:spChg>
+        <pc:grpChg chg="add del mod">
+          <ac:chgData name="FMZ; Allamand Luis" userId="0299a935-3d7a-4961-b16c-bd784a8bde54" providerId="ADAL" clId="{835628C4-37B0-452A-9B17-982F10A0CE80}" dt="2025-04-17T17:38:15.960" v="217" actId="478"/>
+          <ac:grpSpMkLst>
+            <pc:docMk/>
+            <pc:sldMk cId="1911781007" sldId="266"/>
+            <ac:grpSpMk id="16" creationId="{147A982F-FCAF-576E-5B6C-957A5A362D7C}"/>
+          </ac:grpSpMkLst>
+        </pc:grpChg>
+        <pc:picChg chg="add mod">
+          <ac:chgData name="FMZ; Allamand Luis" userId="0299a935-3d7a-4961-b16c-bd784a8bde54" providerId="ADAL" clId="{835628C4-37B0-452A-9B17-982F10A0CE80}" dt="2025-04-17T17:31:13.657" v="4" actId="1076"/>
+          <ac:picMkLst>
+            <pc:docMk/>
+            <pc:sldMk cId="1911781007" sldId="266"/>
+            <ac:picMk id="5" creationId="{D08A6B84-F196-13C3-DAA5-CE803047EC71}"/>
+          </ac:picMkLst>
+        </pc:picChg>
+        <pc:picChg chg="add mod ord">
+          <ac:chgData name="FMZ; Allamand Luis" userId="0299a935-3d7a-4961-b16c-bd784a8bde54" providerId="ADAL" clId="{835628C4-37B0-452A-9B17-982F10A0CE80}" dt="2025-04-17T17:34:05.480" v="82" actId="1035"/>
+          <ac:picMkLst>
+            <pc:docMk/>
+            <pc:sldMk cId="1911781007" sldId="266"/>
+            <ac:picMk id="7" creationId="{1F523BB5-710C-A1D0-5362-4B4F7E638E5B}"/>
+          </ac:picMkLst>
+        </pc:picChg>
+        <pc:picChg chg="add mod">
+          <ac:chgData name="FMZ; Allamand Luis" userId="0299a935-3d7a-4961-b16c-bd784a8bde54" providerId="ADAL" clId="{835628C4-37B0-452A-9B17-982F10A0CE80}" dt="2025-04-17T17:43:15.702" v="485" actId="14100"/>
+          <ac:picMkLst>
+            <pc:docMk/>
+            <pc:sldMk cId="1911781007" sldId="266"/>
+            <ac:picMk id="9" creationId="{AD75B6DB-56B2-4D92-6F2D-85716450D5B2}"/>
+          </ac:picMkLst>
+        </pc:picChg>
+        <pc:picChg chg="add mod ord">
+          <ac:chgData name="FMZ; Allamand Luis" userId="0299a935-3d7a-4961-b16c-bd784a8bde54" providerId="ADAL" clId="{835628C4-37B0-452A-9B17-982F10A0CE80}" dt="2025-04-17T17:41:08.009" v="350" actId="1036"/>
+          <ac:picMkLst>
+            <pc:docMk/>
+            <pc:sldMk cId="1911781007" sldId="266"/>
+            <ac:picMk id="11" creationId="{1C428484-2121-E4B1-DFCC-80508056B8A8}"/>
+          </ac:picMkLst>
+        </pc:picChg>
+        <pc:picChg chg="add mod">
+          <ac:chgData name="FMZ; Allamand Luis" userId="0299a935-3d7a-4961-b16c-bd784a8bde54" providerId="ADAL" clId="{835628C4-37B0-452A-9B17-982F10A0CE80}" dt="2025-04-17T17:41:08.009" v="350" actId="1036"/>
+          <ac:picMkLst>
+            <pc:docMk/>
+            <pc:sldMk cId="1911781007" sldId="266"/>
+            <ac:picMk id="12" creationId="{EB9B7D3D-478A-8DC6-645B-4644A342F378}"/>
+          </ac:picMkLst>
+        </pc:picChg>
+        <pc:picChg chg="add mod">
+          <ac:chgData name="FMZ; Allamand Luis" userId="0299a935-3d7a-4961-b16c-bd784a8bde54" providerId="ADAL" clId="{835628C4-37B0-452A-9B17-982F10A0CE80}" dt="2025-04-17T17:41:08.009" v="350" actId="1036"/>
+          <ac:picMkLst>
+            <pc:docMk/>
+            <pc:sldMk cId="1911781007" sldId="266"/>
+            <ac:picMk id="13" creationId="{5FFA5787-D317-1160-E497-3A2261842F05}"/>
+          </ac:picMkLst>
+        </pc:picChg>
+        <pc:picChg chg="add mod">
+          <ac:chgData name="FMZ; Allamand Luis" userId="0299a935-3d7a-4961-b16c-bd784a8bde54" providerId="ADAL" clId="{835628C4-37B0-452A-9B17-982F10A0CE80}" dt="2025-04-17T17:41:08.009" v="350" actId="1036"/>
+          <ac:picMkLst>
+            <pc:docMk/>
+            <pc:sldMk cId="1911781007" sldId="266"/>
+            <ac:picMk id="14" creationId="{A69C76ED-062E-1BEE-C5AC-1E93E09B8B56}"/>
+          </ac:picMkLst>
+        </pc:picChg>
+        <pc:picChg chg="add mod">
+          <ac:chgData name="FMZ; Allamand Luis" userId="0299a935-3d7a-4961-b16c-bd784a8bde54" providerId="ADAL" clId="{835628C4-37B0-452A-9B17-982F10A0CE80}" dt="2025-04-17T17:41:08.009" v="350" actId="1036"/>
+          <ac:picMkLst>
+            <pc:docMk/>
+            <pc:sldMk cId="1911781007" sldId="266"/>
+            <ac:picMk id="15" creationId="{D2C5041F-C374-596C-4362-0F3BC7E1BCF7}"/>
+          </ac:picMkLst>
+        </pc:picChg>
+        <pc:picChg chg="add mod">
+          <ac:chgData name="FMZ; Allamand Luis" userId="0299a935-3d7a-4961-b16c-bd784a8bde54" providerId="ADAL" clId="{835628C4-37B0-452A-9B17-982F10A0CE80}" dt="2025-04-17T17:41:22.729" v="358" actId="1037"/>
+          <ac:picMkLst>
+            <pc:docMk/>
+            <pc:sldMk cId="1911781007" sldId="266"/>
+            <ac:picMk id="24" creationId="{8F0DCB35-41C4-9051-752C-6D6D92649357}"/>
+          </ac:picMkLst>
+        </pc:picChg>
+        <pc:picChg chg="add del mod">
+          <ac:chgData name="FMZ; Allamand Luis" userId="0299a935-3d7a-4961-b16c-bd784a8bde54" providerId="ADAL" clId="{835628C4-37B0-452A-9B17-982F10A0CE80}" dt="2025-04-17T17:40:31.482" v="314" actId="478"/>
+          <ac:picMkLst>
+            <pc:docMk/>
+            <pc:sldMk cId="1911781007" sldId="266"/>
+            <ac:picMk id="26" creationId="{E9AEA64B-AF7E-20E8-C280-B55E89C04B49}"/>
+          </ac:picMkLst>
+        </pc:picChg>
+        <pc:picChg chg="add mod">
+          <ac:chgData name="FMZ; Allamand Luis" userId="0299a935-3d7a-4961-b16c-bd784a8bde54" providerId="ADAL" clId="{835628C4-37B0-452A-9B17-982F10A0CE80}" dt="2025-04-17T17:43:00.862" v="482" actId="1035"/>
+          <ac:picMkLst>
+            <pc:docMk/>
+            <pc:sldMk cId="1911781007" sldId="266"/>
+            <ac:picMk id="28" creationId="{51411201-E37E-8D57-E36C-BACD09B6B088}"/>
+          </ac:picMkLst>
+        </pc:picChg>
+        <pc:picChg chg="add mod">
+          <ac:chgData name="FMZ; Allamand Luis" userId="0299a935-3d7a-4961-b16c-bd784a8bde54" providerId="ADAL" clId="{835628C4-37B0-452A-9B17-982F10A0CE80}" dt="2025-04-17T17:43:24.031" v="487" actId="14100"/>
+          <ac:picMkLst>
+            <pc:docMk/>
+            <pc:sldMk cId="1911781007" sldId="266"/>
+            <ac:picMk id="29" creationId="{006DDADF-DF05-FFDF-5FDE-2CB40421A484}"/>
+          </ac:picMkLst>
+        </pc:picChg>
+        <pc:picChg chg="add del mod">
+          <ac:chgData name="FMZ; Allamand Luis" userId="0299a935-3d7a-4961-b16c-bd784a8bde54" providerId="ADAL" clId="{835628C4-37B0-452A-9B17-982F10A0CE80}" dt="2025-04-17T17:43:03.904" v="483" actId="478"/>
+          <ac:picMkLst>
+            <pc:docMk/>
+            <pc:sldMk cId="1911781007" sldId="266"/>
+            <ac:picMk id="30" creationId="{FD9403F7-52AE-21D5-0B95-A7F5574DE7D3}"/>
+          </ac:picMkLst>
+        </pc:picChg>
+        <pc:picChg chg="add del mod">
+          <ac:chgData name="FMZ; Allamand Luis" userId="0299a935-3d7a-4961-b16c-bd784a8bde54" providerId="ADAL" clId="{835628C4-37B0-452A-9B17-982F10A0CE80}" dt="2025-04-17T17:43:03.904" v="483" actId="478"/>
+          <ac:picMkLst>
+            <pc:docMk/>
+            <pc:sldMk cId="1911781007" sldId="266"/>
+            <ac:picMk id="31" creationId="{1EEBF225-C324-4FE7-5CEF-EA366CA1E160}"/>
+          </ac:picMkLst>
+        </pc:picChg>
+        <pc:picChg chg="add del mod">
+          <ac:chgData name="FMZ; Allamand Luis" userId="0299a935-3d7a-4961-b16c-bd784a8bde54" providerId="ADAL" clId="{835628C4-37B0-452A-9B17-982F10A0CE80}" dt="2025-04-17T17:43:03.904" v="483" actId="478"/>
+          <ac:picMkLst>
+            <pc:docMk/>
+            <pc:sldMk cId="1911781007" sldId="266"/>
+            <ac:picMk id="32" creationId="{FB7ED78E-4946-DA92-82B0-24AF71D68A01}"/>
+          </ac:picMkLst>
+        </pc:picChg>
+        <pc:picChg chg="add del mod">
+          <ac:chgData name="FMZ; Allamand Luis" userId="0299a935-3d7a-4961-b16c-bd784a8bde54" providerId="ADAL" clId="{835628C4-37B0-452A-9B17-982F10A0CE80}" dt="2025-04-17T17:43:03.904" v="483" actId="478"/>
+          <ac:picMkLst>
+            <pc:docMk/>
+            <pc:sldMk cId="1911781007" sldId="266"/>
+            <ac:picMk id="33" creationId="{C2844A69-A8B3-DD78-111E-2F626A030391}"/>
+          </ac:picMkLst>
+        </pc:picChg>
+        <pc:picChg chg="add mod">
+          <ac:chgData name="FMZ; Allamand Luis" userId="0299a935-3d7a-4961-b16c-bd784a8bde54" providerId="ADAL" clId="{835628C4-37B0-452A-9B17-982F10A0CE80}" dt="2025-04-17T17:43:59.395" v="489" actId="1076"/>
+          <ac:picMkLst>
+            <pc:docMk/>
+            <pc:sldMk cId="1911781007" sldId="266"/>
+            <ac:picMk id="38" creationId="{0F1C4312-E670-017B-A952-20CB6853A384}"/>
+          </ac:picMkLst>
+        </pc:picChg>
+        <pc:picChg chg="add mod ord">
+          <ac:chgData name="FMZ; Allamand Luis" userId="0299a935-3d7a-4961-b16c-bd784a8bde54" providerId="ADAL" clId="{835628C4-37B0-452A-9B17-982F10A0CE80}" dt="2025-04-17T17:44:35.280" v="497" actId="166"/>
+          <ac:picMkLst>
+            <pc:docMk/>
+            <pc:sldMk cId="1911781007" sldId="266"/>
+            <ac:picMk id="40" creationId="{8000D119-2757-2CDA-D8EE-5B939A8066AA}"/>
+          </ac:picMkLst>
+        </pc:picChg>
+        <pc:picChg chg="add mod">
+          <ac:chgData name="FMZ; Allamand Luis" userId="0299a935-3d7a-4961-b16c-bd784a8bde54" providerId="ADAL" clId="{835628C4-37B0-452A-9B17-982F10A0CE80}" dt="2025-04-17T17:44:29.899" v="496" actId="1076"/>
+          <ac:picMkLst>
+            <pc:docMk/>
+            <pc:sldMk cId="1911781007" sldId="266"/>
+            <ac:picMk id="42" creationId="{CC0C1795-69E2-7AB3-C218-7BF41FADEC7A}"/>
+          </ac:picMkLst>
+        </pc:picChg>
+      </pc:sldChg>
+    </pc:docChg>
+  </pc:docChgLst>
 </pc:chgInfo>
 </file>
 
@@ -3039,7 +3336,7 @@
           <a:p>
             <a:fld id="{060F3B39-74C7-44A3-8D23-2F0155D3CD85}" type="datetimeFigureOut">
               <a:rPr lang="de-CH" smtClean="0"/>
-              <a:t>31.03.2025</a:t>
+              <a:t>17.04.2025</a:t>
             </a:fld>
             <a:endParaRPr lang="de-CH"/>
           </a:p>
@@ -4348,7 +4645,7 @@
           <a:p>
             <a:fld id="{EA007704-2C82-4513-BB1C-45DA6420AD74}" type="datetimeFigureOut">
               <a:rPr lang="de-CH" smtClean="0"/>
-              <a:t>31.03.2025</a:t>
+              <a:t>17.04.2025</a:t>
             </a:fld>
             <a:endParaRPr lang="de-CH"/>
           </a:p>
@@ -4548,7 +4845,7 @@
           <a:p>
             <a:fld id="{EA007704-2C82-4513-BB1C-45DA6420AD74}" type="datetimeFigureOut">
               <a:rPr lang="de-CH" smtClean="0"/>
-              <a:t>31.03.2025</a:t>
+              <a:t>17.04.2025</a:t>
             </a:fld>
             <a:endParaRPr lang="de-CH"/>
           </a:p>
@@ -4758,7 +5055,7 @@
           <a:p>
             <a:fld id="{EA007704-2C82-4513-BB1C-45DA6420AD74}" type="datetimeFigureOut">
               <a:rPr lang="de-CH" smtClean="0"/>
-              <a:t>31.03.2025</a:t>
+              <a:t>17.04.2025</a:t>
             </a:fld>
             <a:endParaRPr lang="de-CH"/>
           </a:p>
@@ -4958,7 +5255,7 @@
           <a:p>
             <a:fld id="{EA007704-2C82-4513-BB1C-45DA6420AD74}" type="datetimeFigureOut">
               <a:rPr lang="de-CH" smtClean="0"/>
-              <a:t>31.03.2025</a:t>
+              <a:t>17.04.2025</a:t>
             </a:fld>
             <a:endParaRPr lang="de-CH"/>
           </a:p>
@@ -5234,7 +5531,7 @@
           <a:p>
             <a:fld id="{EA007704-2C82-4513-BB1C-45DA6420AD74}" type="datetimeFigureOut">
               <a:rPr lang="de-CH" smtClean="0"/>
-              <a:t>31.03.2025</a:t>
+              <a:t>17.04.2025</a:t>
             </a:fld>
             <a:endParaRPr lang="de-CH"/>
           </a:p>
@@ -5502,7 +5799,7 @@
           <a:p>
             <a:fld id="{EA007704-2C82-4513-BB1C-45DA6420AD74}" type="datetimeFigureOut">
               <a:rPr lang="de-CH" smtClean="0"/>
-              <a:t>31.03.2025</a:t>
+              <a:t>17.04.2025</a:t>
             </a:fld>
             <a:endParaRPr lang="de-CH"/>
           </a:p>
@@ -5917,7 +6214,7 @@
           <a:p>
             <a:fld id="{EA007704-2C82-4513-BB1C-45DA6420AD74}" type="datetimeFigureOut">
               <a:rPr lang="de-CH" smtClean="0"/>
-              <a:t>31.03.2025</a:t>
+              <a:t>17.04.2025</a:t>
             </a:fld>
             <a:endParaRPr lang="de-CH"/>
           </a:p>
@@ -6059,7 +6356,7 @@
           <a:p>
             <a:fld id="{EA007704-2C82-4513-BB1C-45DA6420AD74}" type="datetimeFigureOut">
               <a:rPr lang="de-CH" smtClean="0"/>
-              <a:t>31.03.2025</a:t>
+              <a:t>17.04.2025</a:t>
             </a:fld>
             <a:endParaRPr lang="de-CH"/>
           </a:p>
@@ -6172,7 +6469,7 @@
           <a:p>
             <a:fld id="{EA007704-2C82-4513-BB1C-45DA6420AD74}" type="datetimeFigureOut">
               <a:rPr lang="de-CH" smtClean="0"/>
-              <a:t>31.03.2025</a:t>
+              <a:t>17.04.2025</a:t>
             </a:fld>
             <a:endParaRPr lang="de-CH"/>
           </a:p>
@@ -6485,7 +6782,7 @@
           <a:p>
             <a:fld id="{EA007704-2C82-4513-BB1C-45DA6420AD74}" type="datetimeFigureOut">
               <a:rPr lang="de-CH" smtClean="0"/>
-              <a:t>31.03.2025</a:t>
+              <a:t>17.04.2025</a:t>
             </a:fld>
             <a:endParaRPr lang="de-CH"/>
           </a:p>
@@ -6774,7 +7071,7 @@
           <a:p>
             <a:fld id="{EA007704-2C82-4513-BB1C-45DA6420AD74}" type="datetimeFigureOut">
               <a:rPr lang="de-CH" smtClean="0"/>
-              <a:t>31.03.2025</a:t>
+              <a:t>17.04.2025</a:t>
             </a:fld>
             <a:endParaRPr lang="de-CH"/>
           </a:p>
@@ -7017,7 +7314,7 @@
           <a:p>
             <a:fld id="{EA007704-2C82-4513-BB1C-45DA6420AD74}" type="datetimeFigureOut">
               <a:rPr lang="de-CH" smtClean="0"/>
-              <a:t>31.03.2025</a:t>
+              <a:t>17.04.2025</a:t>
             </a:fld>
             <a:endParaRPr lang="de-CH"/>
           </a:p>
@@ -23808,8 +24105,8 @@
         </p:nvGrpSpPr>
         <p:grpSpPr>
           <a:xfrm>
-            <a:off x="6294203" y="3559239"/>
-            <a:ext cx="2335841" cy="646331"/>
+            <a:off x="6294200" y="3559239"/>
+            <a:ext cx="2335840" cy="646331"/>
             <a:chOff x="5842547" y="1381350"/>
             <a:chExt cx="2570385" cy="954341"/>
           </a:xfrm>
@@ -24417,8 +24714,8 @@
         </p:nvGrpSpPr>
         <p:grpSpPr>
           <a:xfrm>
-            <a:off x="6075304" y="4386099"/>
-            <a:ext cx="2549713" cy="802761"/>
+            <a:off x="6075298" y="4386099"/>
+            <a:ext cx="2549710" cy="802761"/>
             <a:chOff x="5842547" y="1381350"/>
             <a:chExt cx="2570385" cy="954341"/>
           </a:xfrm>
@@ -25066,8 +25363,8 @@
         </p:nvGrpSpPr>
         <p:grpSpPr>
           <a:xfrm>
-            <a:off x="6281171" y="5359559"/>
-            <a:ext cx="2335840" cy="646332"/>
+            <a:off x="6281169" y="5359559"/>
+            <a:ext cx="2335839" cy="646332"/>
             <a:chOff x="5842548" y="1381349"/>
             <a:chExt cx="2570384" cy="954342"/>
           </a:xfrm>
@@ -42404,6 +42701,987 @@
     <p:extLst>
       <p:ext uri="{BB962C8B-B14F-4D97-AF65-F5344CB8AC3E}">
         <p14:creationId xmlns:p14="http://schemas.microsoft.com/office/powerpoint/2010/main" val="3768884906"/>
+      </p:ext>
+    </p:extLst>
+  </p:cSld>
+  <p:clrMapOvr>
+    <a:masterClrMapping/>
+  </p:clrMapOvr>
+</p:sld>
+</file>
+
+<file path=ppt/slides/slide9.xml><?xml version="1.0" encoding="utf-8"?>
+<p:sld xmlns:a="http://schemas.openxmlformats.org/drawingml/2006/main" xmlns:r="http://schemas.openxmlformats.org/officeDocument/2006/relationships" xmlns:p="http://schemas.openxmlformats.org/presentationml/2006/main">
+  <p:cSld>
+    <p:spTree>
+      <p:nvGrpSpPr>
+        <p:cNvPr id="1" name=""/>
+        <p:cNvGrpSpPr/>
+        <p:nvPr/>
+      </p:nvGrpSpPr>
+      <p:grpSpPr>
+        <a:xfrm>
+          <a:off x="0" y="0"/>
+          <a:ext cx="0" cy="0"/>
+          <a:chOff x="0" y="0"/>
+          <a:chExt cx="0" cy="0"/>
+        </a:xfrm>
+      </p:grpSpPr>
+      <p:pic>
+        <p:nvPicPr>
+          <p:cNvPr id="5" name="Grafik 4">
+            <a:extLst>
+              <a:ext uri="{FF2B5EF4-FFF2-40B4-BE49-F238E27FC236}">
+                <a16:creationId xmlns:a16="http://schemas.microsoft.com/office/drawing/2014/main" id="{D08A6B84-F196-13C3-DAA5-CE803047EC71}"/>
+              </a:ext>
+            </a:extLst>
+          </p:cNvPr>
+          <p:cNvPicPr>
+            <a:picLocks noChangeAspect="1"/>
+          </p:cNvPicPr>
+          <p:nvPr/>
+        </p:nvPicPr>
+        <p:blipFill>
+          <a:blip r:embed="rId2"/>
+          <a:stretch>
+            <a:fillRect/>
+          </a:stretch>
+        </p:blipFill>
+        <p:spPr>
+          <a:xfrm>
+            <a:off x="2357053" y="0"/>
+            <a:ext cx="3378857" cy="6858000"/>
+          </a:xfrm>
+          <a:prstGeom prst="rect">
+            <a:avLst/>
+          </a:prstGeom>
+        </p:spPr>
+      </p:pic>
+      <p:sp>
+        <p:nvSpPr>
+          <p:cNvPr id="8" name="Rechteck 7">
+            <a:extLst>
+              <a:ext uri="{FF2B5EF4-FFF2-40B4-BE49-F238E27FC236}">
+                <a16:creationId xmlns:a16="http://schemas.microsoft.com/office/drawing/2014/main" id="{825E49D4-A7F9-7A1C-D16D-5B984935E901}"/>
+              </a:ext>
+            </a:extLst>
+          </p:cNvPr>
+          <p:cNvSpPr>
+            <a:spLocks noGrp="1" noRot="1" noMove="1" noResize="1" noEditPoints="1" noAdjustHandles="1" noChangeArrowheads="1" noChangeShapeType="1"/>
+          </p:cNvSpPr>
+          <p:nvPr/>
+        </p:nvSpPr>
+        <p:spPr>
+          <a:xfrm>
+            <a:off x="3143250" y="563561"/>
+            <a:ext cx="2438400" cy="5162550"/>
+          </a:xfrm>
+          <a:prstGeom prst="rect">
+            <a:avLst/>
+          </a:prstGeom>
+          <a:solidFill>
+            <a:srgbClr val="FFFFFF"/>
+          </a:solidFill>
+          <a:ln>
+            <a:noFill/>
+          </a:ln>
+        </p:spPr>
+        <p:style>
+          <a:lnRef idx="2">
+            <a:schemeClr val="accent1">
+              <a:shade val="15000"/>
+            </a:schemeClr>
+          </a:lnRef>
+          <a:fillRef idx="1">
+            <a:schemeClr val="accent1"/>
+          </a:fillRef>
+          <a:effectRef idx="0">
+            <a:schemeClr val="accent1"/>
+          </a:effectRef>
+          <a:fontRef idx="minor">
+            <a:schemeClr val="lt1"/>
+          </a:fontRef>
+        </p:style>
+        <p:txBody>
+          <a:bodyPr rtlCol="0" anchor="ctr"/>
+          <a:lstStyle/>
+          <a:p>
+            <a:pPr algn="ctr"/>
+            <a:endParaRPr lang="de-CH"/>
+          </a:p>
+        </p:txBody>
+      </p:sp>
+      <p:pic>
+        <p:nvPicPr>
+          <p:cNvPr id="11" name="Grafik 10" descr="Ein Bild, das Screenshot, Text enthält.&#10;&#10;Automatisch generierte Beschreibung">
+            <a:extLst>
+              <a:ext uri="{FF2B5EF4-FFF2-40B4-BE49-F238E27FC236}">
+                <a16:creationId xmlns:a16="http://schemas.microsoft.com/office/drawing/2014/main" id="{1C428484-2121-E4B1-DFCC-80508056B8A8}"/>
+              </a:ext>
+            </a:extLst>
+          </p:cNvPr>
+          <p:cNvPicPr>
+            <a:picLocks noChangeAspect="1"/>
+          </p:cNvPicPr>
+          <p:nvPr/>
+        </p:nvPicPr>
+        <p:blipFill>
+          <a:blip r:embed="rId3">
+            <a:extLst>
+              <a:ext uri="{28A0092B-C50C-407E-A947-70E740481C1C}">
+                <a14:useLocalDpi xmlns:a14="http://schemas.microsoft.com/office/drawing/2010/main" val="0"/>
+              </a:ext>
+            </a:extLst>
+          </a:blip>
+          <a:stretch>
+            <a:fillRect/>
+          </a:stretch>
+        </p:blipFill>
+        <p:spPr>
+          <a:xfrm>
+            <a:off x="3152776" y="1062279"/>
+            <a:ext cx="2217026" cy="487121"/>
+          </a:xfrm>
+          <a:prstGeom prst="rect">
+            <a:avLst/>
+          </a:prstGeom>
+        </p:spPr>
+      </p:pic>
+      <p:pic>
+        <p:nvPicPr>
+          <p:cNvPr id="7" name="Grafik 6" descr="Ein Bild, das Kreis, Design enthält.&#10;&#10;Automatisch generierte Beschreibung">
+            <a:extLst>
+              <a:ext uri="{FF2B5EF4-FFF2-40B4-BE49-F238E27FC236}">
+                <a16:creationId xmlns:a16="http://schemas.microsoft.com/office/drawing/2014/main" id="{1F523BB5-710C-A1D0-5362-4B4F7E638E5B}"/>
+              </a:ext>
+            </a:extLst>
+          </p:cNvPr>
+          <p:cNvPicPr>
+            <a:picLocks noChangeAspect="1"/>
+          </p:cNvPicPr>
+          <p:nvPr/>
+        </p:nvPicPr>
+        <p:blipFill>
+          <a:blip r:embed="rId4">
+            <a:extLst>
+              <a:ext uri="{BEBA8EAE-BF5A-486C-A8C5-ECC9F3942E4B}">
+                <a14:imgProps xmlns:a14="http://schemas.microsoft.com/office/drawing/2010/main">
+                  <a14:imgLayer r:embed="rId5">
+                    <a14:imgEffect>
+                      <a14:backgroundRemoval t="8654" b="92308" l="8511" r="96809">
+                        <a14:foregroundMark x1="62766" y1="41346" x2="62766" y2="41346"/>
+                        <a14:foregroundMark x1="76596" y1="52885" x2="76596" y2="52885"/>
+                        <a14:foregroundMark x1="76596" y1="53846" x2="70213" y2="62500"/>
+                        <a14:foregroundMark x1="68085" y1="64423" x2="65957" y2="67308"/>
+                        <a14:foregroundMark x1="65957" y1="68269" x2="65957" y2="68269"/>
+                        <a14:foregroundMark x1="29970" y1="57692" x2="27660" y2="59615"/>
+                        <a14:foregroundMark x1="43974" y1="46034" x2="41359" y2="48211"/>
+                        <a14:foregroundMark x1="46298" y1="70727" x2="57866" y2="77623"/>
+                        <a14:foregroundMark x1="29274" y1="60577" x2="30886" y2="61538"/>
+                        <a14:foregroundMark x1="27660" y1="59615" x2="29274" y2="60577"/>
+                        <a14:foregroundMark x1="76767" y1="74892" x2="75057" y2="47079"/>
+                        <a14:foregroundMark x1="40451" y1="43822" x2="37276" y2="46806"/>
+                        <a14:foregroundMark x1="53864" y1="31214" x2="52071" y2="32899"/>
+                        <a14:foregroundMark x1="35587" y1="40767" x2="32063" y2="45014"/>
+                        <a14:foregroundMark x1="36227" y1="60577" x2="36003" y2="61538"/>
+                        <a14:foregroundMark x1="36458" y1="59585" x2="36227" y2="60577"/>
+                        <a14:foregroundMark x1="40170" y1="43645" x2="39274" y2="47494"/>
+                        <a14:foregroundMark x1="54769" y1="83168" x2="57704" y2="83968"/>
+                        <a14:backgroundMark x1="92553" y1="32692" x2="96809" y2="42308"/>
+                        <a14:backgroundMark x1="97872" y1="42308" x2="98936" y2="51923"/>
+                        <a14:backgroundMark x1="98936" y1="54808" x2="98936" y2="58654"/>
+                        <a14:backgroundMark x1="96809" y1="66346" x2="93617" y2="82692"/>
+                        <a14:backgroundMark x1="92553" y1="87500" x2="82979" y2="91346"/>
+                        <a14:backgroundMark x1="88298" y1="92308" x2="62766" y2="91346"/>
+                        <a14:backgroundMark x1="23404" y1="68269" x2="40426" y2="93269"/>
+                        <a14:backgroundMark x1="65957" y1="25000" x2="50000" y2="25962"/>
+                        <a14:backgroundMark x1="42553" y1="26923" x2="31915" y2="38462"/>
+                        <a14:backgroundMark x1="25532" y1="45192" x2="21277" y2="53846"/>
+                        <a14:backgroundMark x1="23404" y1="60577" x2="23404" y2="60577"/>
+                        <a14:backgroundMark x1="45745" y1="24038" x2="55319" y2="28846"/>
+                        <a14:backgroundMark x1="75532" y1="24038" x2="88298" y2="29808"/>
+                        <a14:backgroundMark x1="67021" y1="25000" x2="88298" y2="35577"/>
+                        <a14:backgroundMark x1="29787" y1="44231" x2="25532" y2="53846"/>
+                        <a14:backgroundMark x1="25532" y1="61538" x2="25532" y2="66346"/>
+                        <a14:backgroundMark x1="26596" y1="55769" x2="26596" y2="57692"/>
+                        <a14:backgroundMark x1="27660" y1="61538" x2="27660" y2="61538"/>
+                        <a14:backgroundMark x1="25532" y1="57692" x2="25532" y2="57692"/>
+                        <a14:backgroundMark x1="77660" y1="84615" x2="77660" y2="84615"/>
+                      </a14:backgroundRemoval>
+                    </a14:imgEffect>
+                  </a14:imgLayer>
+                </a14:imgProps>
+              </a:ext>
+              <a:ext uri="{28A0092B-C50C-407E-A947-70E740481C1C}">
+                <a14:useLocalDpi xmlns:a14="http://schemas.microsoft.com/office/drawing/2010/main" val="0"/>
+              </a:ext>
+            </a:extLst>
+          </a:blip>
+          <a:stretch>
+            <a:fillRect/>
+          </a:stretch>
+        </p:blipFill>
+        <p:spPr>
+          <a:xfrm>
+            <a:off x="2976290" y="631681"/>
+            <a:ext cx="283431" cy="313583"/>
+          </a:xfrm>
+          <a:prstGeom prst="rect">
+            <a:avLst/>
+          </a:prstGeom>
+          <a:effectLst>
+            <a:outerShdw blurRad="50800" dist="38100" dir="2700000" algn="tl" rotWithShape="0">
+              <a:prstClr val="black">
+                <a:alpha val="40000"/>
+              </a:prstClr>
+            </a:outerShdw>
+          </a:effectLst>
+        </p:spPr>
+      </p:pic>
+      <p:pic>
+        <p:nvPicPr>
+          <p:cNvPr id="9" name="Picture 4" descr="Kitchen People Pictures | Download Free Images on Unsplash">
+            <a:extLst>
+              <a:ext uri="{FF2B5EF4-FFF2-40B4-BE49-F238E27FC236}">
+                <a16:creationId xmlns:a16="http://schemas.microsoft.com/office/drawing/2014/main" id="{AD75B6DB-56B2-4D92-6F2D-85716450D5B2}"/>
+              </a:ext>
+            </a:extLst>
+          </p:cNvPr>
+          <p:cNvPicPr>
+            <a:picLocks noChangeAspect="1" noChangeArrowheads="1"/>
+          </p:cNvPicPr>
+          <p:nvPr/>
+        </p:nvPicPr>
+        <p:blipFill>
+          <a:blip r:embed="rId6">
+            <a:extLst>
+              <a:ext uri="{28A0092B-C50C-407E-A947-70E740481C1C}">
+                <a14:useLocalDpi xmlns:a14="http://schemas.microsoft.com/office/drawing/2010/main" val="0"/>
+              </a:ext>
+            </a:extLst>
+          </a:blip>
+          <a:srcRect/>
+          <a:stretch>
+            <a:fillRect/>
+          </a:stretch>
+        </p:blipFill>
+        <p:spPr bwMode="auto">
+          <a:xfrm>
+            <a:off x="3143250" y="1596139"/>
+            <a:ext cx="2438400" cy="1568569"/>
+          </a:xfrm>
+          <a:prstGeom prst="rect">
+            <a:avLst/>
+          </a:prstGeom>
+          <a:noFill/>
+          <a:extLst>
+            <a:ext uri="{909E8E84-426E-40DD-AFC4-6F175D3DCCD1}">
+              <a14:hiddenFill xmlns:a14="http://schemas.microsoft.com/office/drawing/2010/main">
+                <a:solidFill>
+                  <a:srgbClr val="FFFFFF"/>
+                </a:solidFill>
+              </a14:hiddenFill>
+            </a:ext>
+          </a:extLst>
+        </p:spPr>
+      </p:pic>
+      <p:pic>
+        <p:nvPicPr>
+          <p:cNvPr id="12" name="Grafik 11" descr="Lesezeichen Silhouette">
+            <a:extLst>
+              <a:ext uri="{FF2B5EF4-FFF2-40B4-BE49-F238E27FC236}">
+                <a16:creationId xmlns:a16="http://schemas.microsoft.com/office/drawing/2014/main" id="{EB9B7D3D-478A-8DC6-645B-4644A342F378}"/>
+              </a:ext>
+            </a:extLst>
+          </p:cNvPr>
+          <p:cNvPicPr>
+            <a:picLocks noChangeAspect="1"/>
+          </p:cNvPicPr>
+          <p:nvPr/>
+        </p:nvPicPr>
+        <p:blipFill>
+          <a:blip r:embed="rId7">
+            <a:extLst>
+              <a:ext uri="{96DAC541-7B7A-43D3-8B79-37D633B846F1}">
+                <asvg:svgBlip xmlns:asvg="http://schemas.microsoft.com/office/drawing/2016/SVG/main" r:embed="rId8"/>
+              </a:ext>
+            </a:extLst>
+          </a:blip>
+          <a:stretch>
+            <a:fillRect/>
+          </a:stretch>
+        </p:blipFill>
+        <p:spPr>
+          <a:xfrm>
+            <a:off x="4651394" y="3232763"/>
+            <a:ext cx="409094" cy="409094"/>
+          </a:xfrm>
+          <a:prstGeom prst="rect">
+            <a:avLst/>
+          </a:prstGeom>
+        </p:spPr>
+      </p:pic>
+      <p:pic>
+        <p:nvPicPr>
+          <p:cNvPr id="13" name="Grafik 12" descr="Senden Silhouette">
+            <a:extLst>
+              <a:ext uri="{FF2B5EF4-FFF2-40B4-BE49-F238E27FC236}">
+                <a16:creationId xmlns:a16="http://schemas.microsoft.com/office/drawing/2014/main" id="{5FFA5787-D317-1160-E497-3A2261842F05}"/>
+              </a:ext>
+            </a:extLst>
+          </p:cNvPr>
+          <p:cNvPicPr>
+            <a:picLocks noChangeAspect="1"/>
+          </p:cNvPicPr>
+          <p:nvPr/>
+        </p:nvPicPr>
+        <p:blipFill>
+          <a:blip r:embed="rId9">
+            <a:extLst>
+              <a:ext uri="{96DAC541-7B7A-43D3-8B79-37D633B846F1}">
+                <asvg:svgBlip xmlns:asvg="http://schemas.microsoft.com/office/drawing/2016/SVG/main" r:embed="rId10"/>
+              </a:ext>
+            </a:extLst>
+          </a:blip>
+          <a:stretch>
+            <a:fillRect/>
+          </a:stretch>
+        </p:blipFill>
+        <p:spPr>
+          <a:xfrm>
+            <a:off x="4311928" y="3218602"/>
+            <a:ext cx="424219" cy="424219"/>
+          </a:xfrm>
+          <a:prstGeom prst="rect">
+            <a:avLst/>
+          </a:prstGeom>
+        </p:spPr>
+      </p:pic>
+      <p:pic>
+        <p:nvPicPr>
+          <p:cNvPr id="14" name="Grafik 13" descr="Herz Silhouette">
+            <a:extLst>
+              <a:ext uri="{FF2B5EF4-FFF2-40B4-BE49-F238E27FC236}">
+                <a16:creationId xmlns:a16="http://schemas.microsoft.com/office/drawing/2014/main" id="{A69C76ED-062E-1BEE-C5AC-1E93E09B8B56}"/>
+              </a:ext>
+            </a:extLst>
+          </p:cNvPr>
+          <p:cNvPicPr>
+            <a:picLocks noChangeAspect="1"/>
+          </p:cNvPicPr>
+          <p:nvPr/>
+        </p:nvPicPr>
+        <p:blipFill>
+          <a:blip r:embed="rId11">
+            <a:extLst>
+              <a:ext uri="{96DAC541-7B7A-43D3-8B79-37D633B846F1}">
+                <asvg:svgBlip xmlns:asvg="http://schemas.microsoft.com/office/drawing/2016/SVG/main" r:embed="rId12"/>
+              </a:ext>
+            </a:extLst>
+          </a:blip>
+          <a:stretch>
+            <a:fillRect/>
+          </a:stretch>
+        </p:blipFill>
+        <p:spPr>
+          <a:xfrm>
+            <a:off x="3548885" y="3228126"/>
+            <a:ext cx="413731" cy="413731"/>
+          </a:xfrm>
+          <a:prstGeom prst="rect">
+            <a:avLst/>
+          </a:prstGeom>
+        </p:spPr>
+      </p:pic>
+      <p:pic>
+        <p:nvPicPr>
+          <p:cNvPr id="15" name="Grafik 14" descr="Untertitel Silhouette">
+            <a:extLst>
+              <a:ext uri="{FF2B5EF4-FFF2-40B4-BE49-F238E27FC236}">
+                <a16:creationId xmlns:a16="http://schemas.microsoft.com/office/drawing/2014/main" id="{D2C5041F-C374-596C-4362-0F3BC7E1BCF7}"/>
+              </a:ext>
+            </a:extLst>
+          </p:cNvPr>
+          <p:cNvPicPr>
+            <a:picLocks noChangeAspect="1"/>
+          </p:cNvPicPr>
+          <p:nvPr/>
+        </p:nvPicPr>
+        <p:blipFill>
+          <a:blip r:embed="rId13">
+            <a:extLst>
+              <a:ext uri="{96DAC541-7B7A-43D3-8B79-37D633B846F1}">
+                <asvg:svgBlip xmlns:asvg="http://schemas.microsoft.com/office/drawing/2016/SVG/main" r:embed="rId14"/>
+              </a:ext>
+            </a:extLst>
+          </a:blip>
+          <a:stretch>
+            <a:fillRect/>
+          </a:stretch>
+        </p:blipFill>
+        <p:spPr>
+          <a:xfrm>
+            <a:off x="3935650" y="3249743"/>
+            <a:ext cx="413732" cy="413732"/>
+          </a:xfrm>
+          <a:prstGeom prst="rect">
+            <a:avLst/>
+          </a:prstGeom>
+        </p:spPr>
+      </p:pic>
+      <p:sp>
+        <p:nvSpPr>
+          <p:cNvPr id="19" name="Textfeld 18">
+            <a:extLst>
+              <a:ext uri="{FF2B5EF4-FFF2-40B4-BE49-F238E27FC236}">
+                <a16:creationId xmlns:a16="http://schemas.microsoft.com/office/drawing/2014/main" id="{10B0A611-C79F-B8C8-DECC-02C144BDE5EB}"/>
+              </a:ext>
+            </a:extLst>
+          </p:cNvPr>
+          <p:cNvSpPr txBox="1"/>
+          <p:nvPr/>
+        </p:nvSpPr>
+        <p:spPr>
+          <a:xfrm>
+            <a:off x="3536595" y="3587915"/>
+            <a:ext cx="413731" cy="246221"/>
+          </a:xfrm>
+          <a:prstGeom prst="rect">
+            <a:avLst/>
+          </a:prstGeom>
+          <a:noFill/>
+        </p:spPr>
+        <p:txBody>
+          <a:bodyPr wrap="square" rtlCol="0">
+            <a:spAutoFit/>
+          </a:bodyPr>
+          <a:lstStyle/>
+          <a:p>
+            <a:r>
+              <a:rPr lang="de-CH" sz="1000" dirty="0">
+                <a:solidFill>
+                  <a:schemeClr val="accent1">
+                    <a:lumMod val="40000"/>
+                    <a:lumOff val="60000"/>
+                  </a:schemeClr>
+                </a:solidFill>
+              </a:rPr>
+              <a:t>11 k</a:t>
+            </a:r>
+          </a:p>
+        </p:txBody>
+      </p:sp>
+      <p:sp>
+        <p:nvSpPr>
+          <p:cNvPr id="20" name="Textfeld 19">
+            <a:extLst>
+              <a:ext uri="{FF2B5EF4-FFF2-40B4-BE49-F238E27FC236}">
+                <a16:creationId xmlns:a16="http://schemas.microsoft.com/office/drawing/2014/main" id="{A0006C0F-3D7A-FDFA-C571-94CBFBC8836E}"/>
+              </a:ext>
+            </a:extLst>
+          </p:cNvPr>
+          <p:cNvSpPr txBox="1"/>
+          <p:nvPr/>
+        </p:nvSpPr>
+        <p:spPr>
+          <a:xfrm>
+            <a:off x="3922072" y="3594138"/>
+            <a:ext cx="413731" cy="246221"/>
+          </a:xfrm>
+          <a:prstGeom prst="rect">
+            <a:avLst/>
+          </a:prstGeom>
+          <a:noFill/>
+        </p:spPr>
+        <p:txBody>
+          <a:bodyPr wrap="square" rtlCol="0">
+            <a:spAutoFit/>
+          </a:bodyPr>
+          <a:lstStyle/>
+          <a:p>
+            <a:r>
+              <a:rPr lang="de-CH" sz="1000" dirty="0">
+                <a:solidFill>
+                  <a:schemeClr val="accent1">
+                    <a:lumMod val="40000"/>
+                    <a:lumOff val="60000"/>
+                  </a:schemeClr>
+                </a:solidFill>
+              </a:rPr>
+              <a:t>14 k</a:t>
+            </a:r>
+          </a:p>
+        </p:txBody>
+      </p:sp>
+      <p:sp>
+        <p:nvSpPr>
+          <p:cNvPr id="21" name="Textfeld 20">
+            <a:extLst>
+              <a:ext uri="{FF2B5EF4-FFF2-40B4-BE49-F238E27FC236}">
+                <a16:creationId xmlns:a16="http://schemas.microsoft.com/office/drawing/2014/main" id="{24AF1350-3143-46F9-89D2-709B1E4DF2A1}"/>
+              </a:ext>
+            </a:extLst>
+          </p:cNvPr>
+          <p:cNvSpPr txBox="1"/>
+          <p:nvPr/>
+        </p:nvSpPr>
+        <p:spPr>
+          <a:xfrm>
+            <a:off x="4324768" y="3581169"/>
+            <a:ext cx="413731" cy="246221"/>
+          </a:xfrm>
+          <a:prstGeom prst="rect">
+            <a:avLst/>
+          </a:prstGeom>
+          <a:noFill/>
+        </p:spPr>
+        <p:txBody>
+          <a:bodyPr wrap="square" rtlCol="0">
+            <a:spAutoFit/>
+          </a:bodyPr>
+          <a:lstStyle/>
+          <a:p>
+            <a:r>
+              <a:rPr lang="de-CH" sz="1000" dirty="0">
+                <a:solidFill>
+                  <a:schemeClr val="accent1">
+                    <a:lumMod val="40000"/>
+                    <a:lumOff val="60000"/>
+                  </a:schemeClr>
+                </a:solidFill>
+              </a:rPr>
+              <a:t>24 k</a:t>
+            </a:r>
+          </a:p>
+        </p:txBody>
+      </p:sp>
+      <p:sp>
+        <p:nvSpPr>
+          <p:cNvPr id="22" name="Textfeld 21">
+            <a:extLst>
+              <a:ext uri="{FF2B5EF4-FFF2-40B4-BE49-F238E27FC236}">
+                <a16:creationId xmlns:a16="http://schemas.microsoft.com/office/drawing/2014/main" id="{85236FFF-FC1D-A36A-558A-B9E792DC8EFD}"/>
+              </a:ext>
+            </a:extLst>
+          </p:cNvPr>
+          <p:cNvSpPr txBox="1"/>
+          <p:nvPr/>
+        </p:nvSpPr>
+        <p:spPr>
+          <a:xfrm>
+            <a:off x="4658855" y="3592678"/>
+            <a:ext cx="413731" cy="246221"/>
+          </a:xfrm>
+          <a:prstGeom prst="rect">
+            <a:avLst/>
+          </a:prstGeom>
+          <a:noFill/>
+        </p:spPr>
+        <p:txBody>
+          <a:bodyPr wrap="square" rtlCol="0">
+            <a:spAutoFit/>
+          </a:bodyPr>
+          <a:lstStyle/>
+          <a:p>
+            <a:r>
+              <a:rPr lang="de-CH" sz="1000" dirty="0">
+                <a:solidFill>
+                  <a:schemeClr val="accent1">
+                    <a:lumMod val="40000"/>
+                    <a:lumOff val="60000"/>
+                  </a:schemeClr>
+                </a:solidFill>
+              </a:rPr>
+              <a:t>323</a:t>
+            </a:r>
+          </a:p>
+        </p:txBody>
+      </p:sp>
+      <p:pic>
+        <p:nvPicPr>
+          <p:cNvPr id="24" name="Grafik 23" descr="Lupe Silhouette">
+            <a:extLst>
+              <a:ext uri="{FF2B5EF4-FFF2-40B4-BE49-F238E27FC236}">
+                <a16:creationId xmlns:a16="http://schemas.microsoft.com/office/drawing/2014/main" id="{8F0DCB35-41C4-9051-752C-6D6D92649357}"/>
+              </a:ext>
+            </a:extLst>
+          </p:cNvPr>
+          <p:cNvPicPr>
+            <a:picLocks noChangeAspect="1"/>
+          </p:cNvPicPr>
+          <p:nvPr/>
+        </p:nvPicPr>
+        <p:blipFill>
+          <a:blip r:embed="rId15">
+            <a:extLst>
+              <a:ext uri="{28A0092B-C50C-407E-A947-70E740481C1C}">
+                <a14:useLocalDpi xmlns:a14="http://schemas.microsoft.com/office/drawing/2010/main" val="0"/>
+              </a:ext>
+              <a:ext uri="{96DAC541-7B7A-43D3-8B79-37D633B846F1}">
+                <asvg:svgBlip xmlns:asvg="http://schemas.microsoft.com/office/drawing/2016/SVG/main" r:embed="rId16"/>
+              </a:ext>
+            </a:extLst>
+          </a:blip>
+          <a:stretch>
+            <a:fillRect/>
+          </a:stretch>
+        </p:blipFill>
+        <p:spPr>
+          <a:xfrm>
+            <a:off x="5265862" y="628977"/>
+            <a:ext cx="239224" cy="239224"/>
+          </a:xfrm>
+          <a:prstGeom prst="rect">
+            <a:avLst/>
+          </a:prstGeom>
+        </p:spPr>
+      </p:pic>
+      <p:sp>
+        <p:nvSpPr>
+          <p:cNvPr id="27" name="Ellipse 26">
+            <a:extLst>
+              <a:ext uri="{FF2B5EF4-FFF2-40B4-BE49-F238E27FC236}">
+                <a16:creationId xmlns:a16="http://schemas.microsoft.com/office/drawing/2014/main" id="{68C337B5-1168-806D-6BFB-85C6FD54C1D5}"/>
+              </a:ext>
+            </a:extLst>
+          </p:cNvPr>
+          <p:cNvSpPr/>
+          <p:nvPr/>
+        </p:nvSpPr>
+        <p:spPr>
+          <a:xfrm>
+            <a:off x="5240975" y="604090"/>
+            <a:ext cx="295349" cy="295349"/>
+          </a:xfrm>
+          <a:prstGeom prst="ellipse">
+            <a:avLst/>
+          </a:prstGeom>
+          <a:noFill/>
+          <a:ln>
+            <a:solidFill>
+              <a:srgbClr val="86CEE9"/>
+            </a:solidFill>
+          </a:ln>
+        </p:spPr>
+        <p:style>
+          <a:lnRef idx="2">
+            <a:schemeClr val="accent1">
+              <a:shade val="15000"/>
+            </a:schemeClr>
+          </a:lnRef>
+          <a:fillRef idx="1">
+            <a:schemeClr val="accent1"/>
+          </a:fillRef>
+          <a:effectRef idx="0">
+            <a:schemeClr val="accent1"/>
+          </a:effectRef>
+          <a:fontRef idx="minor">
+            <a:schemeClr val="lt1"/>
+          </a:fontRef>
+        </p:style>
+        <p:txBody>
+          <a:bodyPr rtlCol="0" anchor="ctr"/>
+          <a:lstStyle/>
+          <a:p>
+            <a:pPr algn="ctr"/>
+            <a:endParaRPr lang="de-CH"/>
+          </a:p>
+        </p:txBody>
+      </p:sp>
+      <p:pic>
+        <p:nvPicPr>
+          <p:cNvPr id="28" name="Grafik 27" descr="Ein Bild, das Screenshot, Text enthält.&#10;&#10;Automatisch generierte Beschreibung">
+            <a:extLst>
+              <a:ext uri="{FF2B5EF4-FFF2-40B4-BE49-F238E27FC236}">
+                <a16:creationId xmlns:a16="http://schemas.microsoft.com/office/drawing/2014/main" id="{51411201-E37E-8D57-E36C-BACD09B6B088}"/>
+              </a:ext>
+            </a:extLst>
+          </p:cNvPr>
+          <p:cNvPicPr>
+            <a:picLocks noChangeAspect="1"/>
+          </p:cNvPicPr>
+          <p:nvPr/>
+        </p:nvPicPr>
+        <p:blipFill>
+          <a:blip r:embed="rId3">
+            <a:extLst>
+              <a:ext uri="{28A0092B-C50C-407E-A947-70E740481C1C}">
+                <a14:useLocalDpi xmlns:a14="http://schemas.microsoft.com/office/drawing/2010/main" val="0"/>
+              </a:ext>
+            </a:extLst>
+          </a:blip>
+          <a:stretch>
+            <a:fillRect/>
+          </a:stretch>
+        </p:blipFill>
+        <p:spPr>
+          <a:xfrm>
+            <a:off x="3162301" y="3853104"/>
+            <a:ext cx="2217026" cy="487121"/>
+          </a:xfrm>
+          <a:prstGeom prst="rect">
+            <a:avLst/>
+          </a:prstGeom>
+        </p:spPr>
+      </p:pic>
+      <p:pic>
+        <p:nvPicPr>
+          <p:cNvPr id="29" name="Picture 4" descr="Kitchen People Pictures | Download Free Images on Unsplash">
+            <a:extLst>
+              <a:ext uri="{FF2B5EF4-FFF2-40B4-BE49-F238E27FC236}">
+                <a16:creationId xmlns:a16="http://schemas.microsoft.com/office/drawing/2014/main" id="{006DDADF-DF05-FFDF-5FDE-2CB40421A484}"/>
+              </a:ext>
+            </a:extLst>
+          </p:cNvPr>
+          <p:cNvPicPr>
+            <a:picLocks noChangeAspect="1" noChangeArrowheads="1"/>
+          </p:cNvPicPr>
+          <p:nvPr/>
+        </p:nvPicPr>
+        <p:blipFill rotWithShape="1">
+          <a:blip r:embed="rId6">
+            <a:extLst>
+              <a:ext uri="{28A0092B-C50C-407E-A947-70E740481C1C}">
+                <a14:useLocalDpi xmlns:a14="http://schemas.microsoft.com/office/drawing/2010/main" val="0"/>
+              </a:ext>
+            </a:extLst>
+          </a:blip>
+          <a:srcRect b="14626"/>
+          <a:stretch/>
+        </p:blipFill>
+        <p:spPr bwMode="auto">
+          <a:xfrm>
+            <a:off x="3152775" y="4386964"/>
+            <a:ext cx="2428875" cy="1339147"/>
+          </a:xfrm>
+          <a:prstGeom prst="rect">
+            <a:avLst/>
+          </a:prstGeom>
+          <a:noFill/>
+          <a:extLst>
+            <a:ext uri="{909E8E84-426E-40DD-AFC4-6F175D3DCCD1}">
+              <a14:hiddenFill xmlns:a14="http://schemas.microsoft.com/office/drawing/2010/main">
+                <a:solidFill>
+                  <a:srgbClr val="FFFFFF"/>
+                </a:solidFill>
+              </a14:hiddenFill>
+            </a:ext>
+          </a:extLst>
+        </p:spPr>
+      </p:pic>
+      <p:pic>
+        <p:nvPicPr>
+          <p:cNvPr id="38" name="Grafik 37">
+            <a:extLst>
+              <a:ext uri="{FF2B5EF4-FFF2-40B4-BE49-F238E27FC236}">
+                <a16:creationId xmlns:a16="http://schemas.microsoft.com/office/drawing/2014/main" id="{0F1C4312-E670-017B-A952-20CB6853A384}"/>
+              </a:ext>
+            </a:extLst>
+          </p:cNvPr>
+          <p:cNvPicPr>
+            <a:picLocks noChangeAspect="1"/>
+          </p:cNvPicPr>
+          <p:nvPr/>
+        </p:nvPicPr>
+        <p:blipFill>
+          <a:blip r:embed="rId2"/>
+          <a:stretch>
+            <a:fillRect/>
+          </a:stretch>
+        </p:blipFill>
+        <p:spPr>
+          <a:xfrm>
+            <a:off x="5869481" y="0"/>
+            <a:ext cx="3378857" cy="6858000"/>
+          </a:xfrm>
+          <a:prstGeom prst="rect">
+            <a:avLst/>
+          </a:prstGeom>
+        </p:spPr>
+      </p:pic>
+      <p:sp>
+        <p:nvSpPr>
+          <p:cNvPr id="39" name="Rechteck 38">
+            <a:extLst>
+              <a:ext uri="{FF2B5EF4-FFF2-40B4-BE49-F238E27FC236}">
+                <a16:creationId xmlns:a16="http://schemas.microsoft.com/office/drawing/2014/main" id="{071E423D-35A2-AFA4-2E8B-91DC1E0422B3}"/>
+              </a:ext>
+            </a:extLst>
+          </p:cNvPr>
+          <p:cNvSpPr/>
+          <p:nvPr/>
+        </p:nvSpPr>
+        <p:spPr>
+          <a:xfrm>
+            <a:off x="6655678" y="563561"/>
+            <a:ext cx="2438400" cy="5162550"/>
+          </a:xfrm>
+          <a:prstGeom prst="rect">
+            <a:avLst/>
+          </a:prstGeom>
+          <a:solidFill>
+            <a:srgbClr val="FFFFFF"/>
+          </a:solidFill>
+          <a:ln>
+            <a:noFill/>
+          </a:ln>
+        </p:spPr>
+        <p:style>
+          <a:lnRef idx="2">
+            <a:schemeClr val="accent1">
+              <a:shade val="15000"/>
+            </a:schemeClr>
+          </a:lnRef>
+          <a:fillRef idx="1">
+            <a:schemeClr val="accent1"/>
+          </a:fillRef>
+          <a:effectRef idx="0">
+            <a:schemeClr val="accent1"/>
+          </a:effectRef>
+          <a:fontRef idx="minor">
+            <a:schemeClr val="lt1"/>
+          </a:fontRef>
+        </p:style>
+        <p:txBody>
+          <a:bodyPr rtlCol="0" anchor="ctr"/>
+          <a:lstStyle/>
+          <a:p>
+            <a:pPr algn="ctr"/>
+            <a:endParaRPr lang="de-CH"/>
+          </a:p>
+        </p:txBody>
+      </p:sp>
+      <p:pic>
+        <p:nvPicPr>
+          <p:cNvPr id="42" name="Grafik 41" descr="Ein Bild, das Kleidung, Mann, Menschliches Gesicht, Person enthält.&#10;&#10;Automatisch generierte Beschreibung">
+            <a:extLst>
+              <a:ext uri="{FF2B5EF4-FFF2-40B4-BE49-F238E27FC236}">
+                <a16:creationId xmlns:a16="http://schemas.microsoft.com/office/drawing/2014/main" id="{CC0C1795-69E2-7AB3-C218-7BF41FADEC7A}"/>
+              </a:ext>
+            </a:extLst>
+          </p:cNvPr>
+          <p:cNvPicPr>
+            <a:picLocks noChangeAspect="1"/>
+          </p:cNvPicPr>
+          <p:nvPr/>
+        </p:nvPicPr>
+        <p:blipFill>
+          <a:blip r:embed="rId17">
+            <a:extLst>
+              <a:ext uri="{28A0092B-C50C-407E-A947-70E740481C1C}">
+                <a14:useLocalDpi xmlns:a14="http://schemas.microsoft.com/office/drawing/2010/main" val="0"/>
+              </a:ext>
+            </a:extLst>
+          </a:blip>
+          <a:stretch>
+            <a:fillRect/>
+          </a:stretch>
+        </p:blipFill>
+        <p:spPr>
+          <a:xfrm>
+            <a:off x="6655678" y="606589"/>
+            <a:ext cx="2413031" cy="4820399"/>
+          </a:xfrm>
+          <a:prstGeom prst="rect">
+            <a:avLst/>
+          </a:prstGeom>
+        </p:spPr>
+      </p:pic>
+      <p:pic>
+        <p:nvPicPr>
+          <p:cNvPr id="40" name="Grafik 39" descr="Ein Bild, das Kreis, Design enthält.&#10;&#10;Automatisch generierte Beschreibung">
+            <a:extLst>
+              <a:ext uri="{FF2B5EF4-FFF2-40B4-BE49-F238E27FC236}">
+                <a16:creationId xmlns:a16="http://schemas.microsoft.com/office/drawing/2014/main" id="{8000D119-2757-2CDA-D8EE-5B939A8066AA}"/>
+              </a:ext>
+            </a:extLst>
+          </p:cNvPr>
+          <p:cNvPicPr>
+            <a:picLocks noChangeAspect="1"/>
+          </p:cNvPicPr>
+          <p:nvPr/>
+        </p:nvPicPr>
+        <p:blipFill>
+          <a:blip r:embed="rId4">
+            <a:extLst>
+              <a:ext uri="{BEBA8EAE-BF5A-486C-A8C5-ECC9F3942E4B}">
+                <a14:imgProps xmlns:a14="http://schemas.microsoft.com/office/drawing/2010/main">
+                  <a14:imgLayer r:embed="rId5">
+                    <a14:imgEffect>
+                      <a14:backgroundRemoval t="8654" b="92308" l="8511" r="96809">
+                        <a14:foregroundMark x1="62766" y1="41346" x2="62766" y2="41346"/>
+                        <a14:foregroundMark x1="76596" y1="52885" x2="76596" y2="52885"/>
+                        <a14:foregroundMark x1="76596" y1="53846" x2="70213" y2="62500"/>
+                        <a14:foregroundMark x1="68085" y1="64423" x2="65957" y2="67308"/>
+                        <a14:foregroundMark x1="65957" y1="68269" x2="65957" y2="68269"/>
+                        <a14:foregroundMark x1="29970" y1="57692" x2="27660" y2="59615"/>
+                        <a14:foregroundMark x1="43974" y1="46034" x2="41359" y2="48211"/>
+                        <a14:foregroundMark x1="46298" y1="70727" x2="57866" y2="77623"/>
+                        <a14:foregroundMark x1="29274" y1="60577" x2="30886" y2="61538"/>
+                        <a14:foregroundMark x1="27660" y1="59615" x2="29274" y2="60577"/>
+                        <a14:foregroundMark x1="76767" y1="74892" x2="75057" y2="47079"/>
+                        <a14:foregroundMark x1="40451" y1="43822" x2="37276" y2="46806"/>
+                        <a14:foregroundMark x1="53864" y1="31214" x2="52071" y2="32899"/>
+                        <a14:foregroundMark x1="35587" y1="40767" x2="32063" y2="45014"/>
+                        <a14:foregroundMark x1="36227" y1="60577" x2="36003" y2="61538"/>
+                        <a14:foregroundMark x1="36458" y1="59585" x2="36227" y2="60577"/>
+                        <a14:foregroundMark x1="40170" y1="43645" x2="39274" y2="47494"/>
+                        <a14:foregroundMark x1="54769" y1="83168" x2="57704" y2="83968"/>
+                        <a14:backgroundMark x1="92553" y1="32692" x2="96809" y2="42308"/>
+                        <a14:backgroundMark x1="97872" y1="42308" x2="98936" y2="51923"/>
+                        <a14:backgroundMark x1="98936" y1="54808" x2="98936" y2="58654"/>
+                        <a14:backgroundMark x1="96809" y1="66346" x2="93617" y2="82692"/>
+                        <a14:backgroundMark x1="92553" y1="87500" x2="82979" y2="91346"/>
+                        <a14:backgroundMark x1="88298" y1="92308" x2="62766" y2="91346"/>
+                        <a14:backgroundMark x1="23404" y1="68269" x2="40426" y2="93269"/>
+                        <a14:backgroundMark x1="65957" y1="25000" x2="50000" y2="25962"/>
+                        <a14:backgroundMark x1="42553" y1="26923" x2="31915" y2="38462"/>
+                        <a14:backgroundMark x1="25532" y1="45192" x2="21277" y2="53846"/>
+                        <a14:backgroundMark x1="23404" y1="60577" x2="23404" y2="60577"/>
+                        <a14:backgroundMark x1="45745" y1="24038" x2="55319" y2="28846"/>
+                        <a14:backgroundMark x1="75532" y1="24038" x2="88298" y2="29808"/>
+                        <a14:backgroundMark x1="67021" y1="25000" x2="88298" y2="35577"/>
+                        <a14:backgroundMark x1="29787" y1="44231" x2="25532" y2="53846"/>
+                        <a14:backgroundMark x1="25532" y1="61538" x2="25532" y2="66346"/>
+                        <a14:backgroundMark x1="26596" y1="55769" x2="26596" y2="57692"/>
+                        <a14:backgroundMark x1="27660" y1="61538" x2="27660" y2="61538"/>
+                        <a14:backgroundMark x1="25532" y1="57692" x2="25532" y2="57692"/>
+                        <a14:backgroundMark x1="77660" y1="84615" x2="77660" y2="84615"/>
+                      </a14:backgroundRemoval>
+                    </a14:imgEffect>
+                  </a14:imgLayer>
+                </a14:imgProps>
+              </a:ext>
+              <a:ext uri="{28A0092B-C50C-407E-A947-70E740481C1C}">
+                <a14:useLocalDpi xmlns:a14="http://schemas.microsoft.com/office/drawing/2010/main" val="0"/>
+              </a:ext>
+            </a:extLst>
+          </a:blip>
+          <a:stretch>
+            <a:fillRect/>
+          </a:stretch>
+        </p:blipFill>
+        <p:spPr>
+          <a:xfrm>
+            <a:off x="6488718" y="631681"/>
+            <a:ext cx="283431" cy="313583"/>
+          </a:xfrm>
+          <a:prstGeom prst="rect">
+            <a:avLst/>
+          </a:prstGeom>
+          <a:effectLst>
+            <a:outerShdw blurRad="50800" dist="38100" dir="2700000" algn="tl" rotWithShape="0">
+              <a:prstClr val="black">
+                <a:alpha val="40000"/>
+              </a:prstClr>
+            </a:outerShdw>
+          </a:effectLst>
+        </p:spPr>
+      </p:pic>
+    </p:spTree>
+    <p:extLst>
+      <p:ext uri="{BB962C8B-B14F-4D97-AF65-F5344CB8AC3E}">
+        <p14:creationId xmlns:p14="http://schemas.microsoft.com/office/powerpoint/2010/main" val="1911781007"/>
       </p:ext>
     </p:extLst>
   </p:cSld>

</xml_diff>